<commit_message>
added the gameplay mission to spacestation
</commit_message>
<xml_diff>
--- a/documents/brief explanatations.pptx
+++ b/documents/brief explanatations.pptx
@@ -105,6 +105,11 @@
       </a:defRPr>
     </a:lvl9pPr>
   </p:defaultTextStyle>
+  <p:extLst>
+    <p:ext uri="{EFAFB233-063F-42B5-8137-9DF3F51BA10A}">
+      <p15:sldGuideLst xmlns:p15="http://schemas.microsoft.com/office/powerpoint/2012/main"/>
+    </p:ext>
+  </p:extLst>
 </p:presentation>
 </file>
 
@@ -5928,7 +5933,7 @@
         <p:spPr>
           <a:xfrm>
             <a:off x="727788" y="373224"/>
-            <a:ext cx="9545216" cy="2893100"/>
+            <a:ext cx="9545216" cy="4001095"/>
           </a:xfrm>
           <a:prstGeom prst="rect">
             <a:avLst/>
@@ -5983,7 +5988,37 @@
             </a:pPr>
             <a:r>
               <a:rPr lang="en-AU" dirty="0" smtClean="0"/>
-              <a:t>It was envisioned that there were 4 astronauts aboard this vessel so I tried to be sparse with equipment as only 4 people occupy the area, such as only 4 mugs.</a:t>
+              <a:t>It was envisioned that there were 4 astronauts aboard this vessel so I tried to be sparse with equipment as only 4 people occupy the area, such as only 4 mugs</a:t>
+            </a:r>
+            <a:r>
+              <a:rPr lang="en-AU" dirty="0" smtClean="0"/>
+              <a:t>.</a:t>
+            </a:r>
+          </a:p>
+          <a:p>
+            <a:pPr marL="285750" indent="-285750">
+              <a:buFont typeface="Arial" panose="020B0604020202020204" pitchFamily="34" charset="0"/>
+              <a:buChar char="•"/>
+            </a:pPr>
+            <a:r>
+              <a:rPr lang="en-AU" dirty="0" smtClean="0"/>
+              <a:t>As a mission, the player is to notice the abandoned computers in the 1</a:t>
+            </a:r>
+            <a:r>
+              <a:rPr lang="en-AU" baseline="30000" dirty="0" smtClean="0"/>
+              <a:t>st</a:t>
+            </a:r>
+            <a:r>
+              <a:rPr lang="en-AU" dirty="0" smtClean="0"/>
+              <a:t> corridor, as they are the communication to the earth… as you travel to the 3</a:t>
+            </a:r>
+            <a:r>
+              <a:rPr lang="en-AU" baseline="30000" dirty="0" smtClean="0"/>
+              <a:t>rd</a:t>
+            </a:r>
+            <a:r>
+              <a:rPr lang="en-AU" dirty="0" smtClean="0"/>
+              <a:t> corridor you notice the poster board and the alone computer out of place and you go and use it to turn on the other computers to communicate with earth.</a:t>
             </a:r>
             <a:endParaRPr lang="en-AU" dirty="0"/>
           </a:p>

</xml_diff>